<commit_message>
add to redirect page when clicked logout button
</commit_message>
<xml_diff>
--- a/doc/캡스톤디자인4조_중간발표.pptx
+++ b/doc/캡스톤디자인4조_중간발표.pptx
@@ -1059,31 +1059,7 @@
                 <a:ea typeface="+mn-ea"/>
                 <a:cs typeface="+mn-cs"/>
               </a:rPr>
-              <a:t>방식의 </a:t>
-            </a:r>
-            <a:r>
-              <a:rPr lang="en-US" altLang="ko-KR" sz="1200" kern="1200" dirty="0">
-                <a:solidFill>
-                  <a:schemeClr val="tx1"/>
-                </a:solidFill>
-                <a:effectLst/>
-                <a:latin typeface="+mn-lt"/>
-                <a:ea typeface="+mn-ea"/>
-                <a:cs typeface="+mn-cs"/>
-              </a:rPr>
-              <a:t>Single thread process</a:t>
-            </a:r>
-            <a:r>
-              <a:rPr lang="ko-KR" altLang="en-US" sz="1200" kern="1200" dirty="0">
-                <a:solidFill>
-                  <a:schemeClr val="tx1"/>
-                </a:solidFill>
-                <a:effectLst/>
-                <a:latin typeface="+mn-lt"/>
-                <a:ea typeface="+mn-ea"/>
-                <a:cs typeface="+mn-cs"/>
-              </a:rPr>
-              <a:t>로 구성되어 가볍고 빠릅니다</a:t>
+              <a:t>방식으로 구성되어 가볍고 빠릅니다</a:t>
             </a:r>
             <a:r>
               <a:rPr lang="en-US" altLang="ko-KR" sz="1200" kern="1200" dirty="0">
@@ -4150,7 +4126,7 @@
             </a:r>
             <a:r>
               <a:rPr lang="ko-KR" altLang="en-US" dirty="0"/>
-              <a:t>엔진을 통한 진단을 하기위해 데이터는 설문지를 통해서 얻어집니다</a:t>
+              <a:t>엔진을 통한 진단을 하기위해 증상 데이터는 설문지를 통해서 얻어집니다</a:t>
             </a:r>
             <a:r>
               <a:rPr lang="en-US" altLang="ko-KR" dirty="0"/>
@@ -4389,6 +4365,9 @@
               </a:rPr>
               <a:t>. </a:t>
             </a:r>
+          </a:p>
+          <a:p>
+            <a:pPr fontAlgn="base" latinLnBrk="1"/>
             <a:r>
               <a:rPr lang="ko-KR" altLang="en-US" sz="1200" kern="1200" dirty="0">
                 <a:solidFill>
@@ -5782,7 +5761,7 @@
                 <a:ea typeface="+mn-ea"/>
                 <a:cs typeface="+mn-cs"/>
               </a:rPr>
-              <a:t>attribut들은</a:t>
+              <a:t>attribute들은</a:t>
             </a:r>
             <a:r>
               <a:rPr lang="en-US" altLang="ko-KR" sz="1200" kern="1200" dirty="0">

</xml_diff>